<commit_message>
finished HW6, finished slide for handing in
</commit_message>
<xml_diff>
--- a/HW6/DSSS_HW6_JImhoff.pptx
+++ b/HW6/DSSS_HW6_JImhoff.pptx
@@ -254,7 +254,7 @@
           <a:p>
             <a:fld id="{1DC94265-D558-479C-B273-1E0799ACBC99}" type="datetimeFigureOut">
               <a:rPr lang="en-GB" smtClean="0"/>
-              <a:t>03/12/2024</a:t>
+              <a:t>05/12/2024</a:t>
             </a:fld>
             <a:endParaRPr lang="en-GB"/>
           </a:p>
@@ -424,7 +424,7 @@
           <a:p>
             <a:fld id="{1DC94265-D558-479C-B273-1E0799ACBC99}" type="datetimeFigureOut">
               <a:rPr lang="en-GB" smtClean="0"/>
-              <a:t>03/12/2024</a:t>
+              <a:t>05/12/2024</a:t>
             </a:fld>
             <a:endParaRPr lang="en-GB"/>
           </a:p>
@@ -604,7 +604,7 @@
           <a:p>
             <a:fld id="{1DC94265-D558-479C-B273-1E0799ACBC99}" type="datetimeFigureOut">
               <a:rPr lang="en-GB" smtClean="0"/>
-              <a:t>03/12/2024</a:t>
+              <a:t>05/12/2024</a:t>
             </a:fld>
             <a:endParaRPr lang="en-GB"/>
           </a:p>
@@ -774,7 +774,7 @@
           <a:p>
             <a:fld id="{1DC94265-D558-479C-B273-1E0799ACBC99}" type="datetimeFigureOut">
               <a:rPr lang="en-GB" smtClean="0"/>
-              <a:t>03/12/2024</a:t>
+              <a:t>05/12/2024</a:t>
             </a:fld>
             <a:endParaRPr lang="en-GB"/>
           </a:p>
@@ -1020,7 +1020,7 @@
           <a:p>
             <a:fld id="{1DC94265-D558-479C-B273-1E0799ACBC99}" type="datetimeFigureOut">
               <a:rPr lang="en-GB" smtClean="0"/>
-              <a:t>03/12/2024</a:t>
+              <a:t>05/12/2024</a:t>
             </a:fld>
             <a:endParaRPr lang="en-GB"/>
           </a:p>
@@ -1252,7 +1252,7 @@
           <a:p>
             <a:fld id="{1DC94265-D558-479C-B273-1E0799ACBC99}" type="datetimeFigureOut">
               <a:rPr lang="en-GB" smtClean="0"/>
-              <a:t>03/12/2024</a:t>
+              <a:t>05/12/2024</a:t>
             </a:fld>
             <a:endParaRPr lang="en-GB"/>
           </a:p>
@@ -1619,7 +1619,7 @@
           <a:p>
             <a:fld id="{1DC94265-D558-479C-B273-1E0799ACBC99}" type="datetimeFigureOut">
               <a:rPr lang="en-GB" smtClean="0"/>
-              <a:t>03/12/2024</a:t>
+              <a:t>05/12/2024</a:t>
             </a:fld>
             <a:endParaRPr lang="en-GB"/>
           </a:p>
@@ -1737,7 +1737,7 @@
           <a:p>
             <a:fld id="{1DC94265-D558-479C-B273-1E0799ACBC99}" type="datetimeFigureOut">
               <a:rPr lang="en-GB" smtClean="0"/>
-              <a:t>03/12/2024</a:t>
+              <a:t>05/12/2024</a:t>
             </a:fld>
             <a:endParaRPr lang="en-GB"/>
           </a:p>
@@ -1832,7 +1832,7 @@
           <a:p>
             <a:fld id="{1DC94265-D558-479C-B273-1E0799ACBC99}" type="datetimeFigureOut">
               <a:rPr lang="en-GB" smtClean="0"/>
-              <a:t>03/12/2024</a:t>
+              <a:t>05/12/2024</a:t>
             </a:fld>
             <a:endParaRPr lang="en-GB"/>
           </a:p>
@@ -2109,7 +2109,7 @@
           <a:p>
             <a:fld id="{1DC94265-D558-479C-B273-1E0799ACBC99}" type="datetimeFigureOut">
               <a:rPr lang="en-GB" smtClean="0"/>
-              <a:t>03/12/2024</a:t>
+              <a:t>05/12/2024</a:t>
             </a:fld>
             <a:endParaRPr lang="en-GB"/>
           </a:p>
@@ -2366,7 +2366,7 @@
           <a:p>
             <a:fld id="{1DC94265-D558-479C-B273-1E0799ACBC99}" type="datetimeFigureOut">
               <a:rPr lang="en-GB" smtClean="0"/>
-              <a:t>03/12/2024</a:t>
+              <a:t>05/12/2024</a:t>
             </a:fld>
             <a:endParaRPr lang="en-GB"/>
           </a:p>
@@ -2579,7 +2579,7 @@
           <a:p>
             <a:fld id="{1DC94265-D558-479C-B273-1E0799ACBC99}" type="datetimeFigureOut">
               <a:rPr lang="en-GB" smtClean="0"/>
-              <a:t>03/12/2024</a:t>
+              <a:t>05/12/2024</a:t>
             </a:fld>
             <a:endParaRPr lang="en-GB"/>
           </a:p>
@@ -3061,8 +3061,8 @@
         </p:nvSpPr>
         <p:spPr>
           <a:xfrm>
-            <a:off x="358666" y="590926"/>
-            <a:ext cx="4722428" cy="461665"/>
+            <a:off x="358666" y="322544"/>
+            <a:ext cx="2121187" cy="461665"/>
           </a:xfrm>
           <a:prstGeom prst="rect">
             <a:avLst/>
@@ -3084,10 +3084,10 @@
       </p:sp>
       <p:pic>
         <p:nvPicPr>
-          <p:cNvPr id="8" name="Grafik 7">
+          <p:cNvPr id="12" name="Grafik 11" descr="Ein Bild, das Text, Screenshot, Diagramm, Reihe enthält.&#10;&#10;Automatisch generierte Beschreibung">
             <a:extLst>
               <a:ext uri="{FF2B5EF4-FFF2-40B4-BE49-F238E27FC236}">
-                <a16:creationId xmlns:a16="http://schemas.microsoft.com/office/drawing/2014/main" id="{79D7C609-17BF-D416-25EE-3FA7CA5CC082}"/>
+                <a16:creationId xmlns:a16="http://schemas.microsoft.com/office/drawing/2014/main" id="{01B306AB-DFF1-86C5-DAB0-2C1BCFF450D6}"/>
               </a:ext>
             </a:extLst>
           </p:cNvPr>
@@ -3097,15 +3097,20 @@
           <p:nvPr/>
         </p:nvPicPr>
         <p:blipFill>
-          <a:blip r:embed="rId2"/>
-          <a:stretch>
-            <a:fillRect/>
-          </a:stretch>
+          <a:blip r:embed="rId2">
+            <a:extLst>
+              <a:ext uri="{28A0092B-C50C-407E-A947-70E740481C1C}">
+                <a14:useLocalDpi xmlns:a14="http://schemas.microsoft.com/office/drawing/2010/main" val="0"/>
+              </a:ext>
+            </a:extLst>
+          </a:blip>
+          <a:srcRect l="4115" t="6375" r="7259" b="1291"/>
+          <a:stretch/>
         </p:blipFill>
         <p:spPr>
           <a:xfrm>
-            <a:off x="300893" y="1052591"/>
-            <a:ext cx="3240000" cy="2129245"/>
+            <a:off x="5940150" y="3939755"/>
+            <a:ext cx="3321943" cy="2595701"/>
           </a:xfrm>
           <a:prstGeom prst="rect">
             <a:avLst/>
@@ -3114,10 +3119,10 @@
       </p:pic>
       <p:pic>
         <p:nvPicPr>
-          <p:cNvPr id="12" name="Grafik 11" descr="Ein Bild, das Text, Screenshot, Diagramm, Reihe enthält.&#10;&#10;Automatisch generierte Beschreibung">
+          <p:cNvPr id="3" name="Grafik 2" descr="Ein Bild, das Text, Screenshot, Schwarz, Schwarzweiß enthält.&#10;&#10;Automatisch generierte Beschreibung">
             <a:extLst>
               <a:ext uri="{FF2B5EF4-FFF2-40B4-BE49-F238E27FC236}">
-                <a16:creationId xmlns:a16="http://schemas.microsoft.com/office/drawing/2014/main" id="{01B306AB-DFF1-86C5-DAB0-2C1BCFF450D6}"/>
+                <a16:creationId xmlns:a16="http://schemas.microsoft.com/office/drawing/2014/main" id="{DA429660-E323-5A2E-5B77-EEDAFE0D4867}"/>
               </a:ext>
             </a:extLst>
           </p:cNvPr>
@@ -3134,13 +3139,193 @@
               </a:ext>
             </a:extLst>
           </a:blip>
-          <a:srcRect l="4115" t="6375" r="7259" b="1291"/>
+          <a:stretch>
+            <a:fillRect/>
+          </a:stretch>
+        </p:blipFill>
+        <p:spPr>
+          <a:xfrm>
+            <a:off x="2994280" y="2733509"/>
+            <a:ext cx="2520000" cy="1331948"/>
+          </a:xfrm>
+          <a:prstGeom prst="rect">
+            <a:avLst/>
+          </a:prstGeom>
+        </p:spPr>
+      </p:pic>
+      <p:pic>
+        <p:nvPicPr>
+          <p:cNvPr id="7" name="Grafik 6" descr="Ein Bild, das Text, Screenshot, Schwarzweiß, monochrome Fotografie enthält.&#10;&#10;Automatisch generierte Beschreibung">
+            <a:extLst>
+              <a:ext uri="{FF2B5EF4-FFF2-40B4-BE49-F238E27FC236}">
+                <a16:creationId xmlns:a16="http://schemas.microsoft.com/office/drawing/2014/main" id="{62ADD4D7-0DE5-78A7-2CDB-54999EFDA988}"/>
+              </a:ext>
+            </a:extLst>
+          </p:cNvPr>
+          <p:cNvPicPr>
+            <a:picLocks noChangeAspect="1"/>
+          </p:cNvPicPr>
+          <p:nvPr/>
+        </p:nvPicPr>
+        <p:blipFill>
+          <a:blip r:embed="rId4">
+            <a:extLst>
+              <a:ext uri="{28A0092B-C50C-407E-A947-70E740481C1C}">
+                <a14:useLocalDpi xmlns:a14="http://schemas.microsoft.com/office/drawing/2010/main" val="0"/>
+              </a:ext>
+            </a:extLst>
+          </a:blip>
+          <a:stretch>
+            <a:fillRect/>
+          </a:stretch>
+        </p:blipFill>
+        <p:spPr>
+          <a:xfrm>
+            <a:off x="2994280" y="4166729"/>
+            <a:ext cx="2520000" cy="2368727"/>
+          </a:xfrm>
+          <a:prstGeom prst="rect">
+            <a:avLst/>
+          </a:prstGeom>
+        </p:spPr>
+      </p:pic>
+      <p:pic>
+        <p:nvPicPr>
+          <p:cNvPr id="10" name="Grafik 9" descr="Ein Bild, das Text, Screenshot, medizinische Bildgebung enthält.&#10;&#10;Automatisch generierte Beschreibung">
+            <a:extLst>
+              <a:ext uri="{FF2B5EF4-FFF2-40B4-BE49-F238E27FC236}">
+                <a16:creationId xmlns:a16="http://schemas.microsoft.com/office/drawing/2014/main" id="{B6BD68FE-D29C-DDCD-A516-6EEF348C6F74}"/>
+              </a:ext>
+            </a:extLst>
+          </p:cNvPr>
+          <p:cNvPicPr>
+            <a:picLocks noChangeAspect="1"/>
+          </p:cNvPicPr>
+          <p:nvPr/>
+        </p:nvPicPr>
+        <p:blipFill>
+          <a:blip r:embed="rId5">
+            <a:extLst>
+              <a:ext uri="{28A0092B-C50C-407E-A947-70E740481C1C}">
+                <a14:useLocalDpi xmlns:a14="http://schemas.microsoft.com/office/drawing/2010/main" val="0"/>
+              </a:ext>
+            </a:extLst>
+          </a:blip>
+          <a:stretch>
+            <a:fillRect/>
+          </a:stretch>
+        </p:blipFill>
+        <p:spPr>
+          <a:xfrm>
+            <a:off x="358666" y="3429000"/>
+            <a:ext cx="2520000" cy="2368727"/>
+          </a:xfrm>
+          <a:prstGeom prst="rect">
+            <a:avLst/>
+          </a:prstGeom>
+        </p:spPr>
+      </p:pic>
+      <p:pic>
+        <p:nvPicPr>
+          <p:cNvPr id="13" name="Grafik 12" descr="Ein Bild, das Screenshot, medizinische Bildgebung, Text, Schwarzweiß enthält.&#10;&#10;Automatisch generierte Beschreibung">
+            <a:extLst>
+              <a:ext uri="{FF2B5EF4-FFF2-40B4-BE49-F238E27FC236}">
+                <a16:creationId xmlns:a16="http://schemas.microsoft.com/office/drawing/2014/main" id="{343AB49A-553B-CD34-C548-64BF2AB64BDE}"/>
+              </a:ext>
+            </a:extLst>
+          </p:cNvPr>
+          <p:cNvPicPr>
+            <a:picLocks noChangeAspect="1"/>
+          </p:cNvPicPr>
+          <p:nvPr/>
+        </p:nvPicPr>
+        <p:blipFill>
+          <a:blip r:embed="rId6">
+            <a:extLst>
+              <a:ext uri="{28A0092B-C50C-407E-A947-70E740481C1C}">
+                <a14:useLocalDpi xmlns:a14="http://schemas.microsoft.com/office/drawing/2010/main" val="0"/>
+              </a:ext>
+            </a:extLst>
+          </a:blip>
+          <a:stretch>
+            <a:fillRect/>
+          </a:stretch>
+        </p:blipFill>
+        <p:spPr>
+          <a:xfrm>
+            <a:off x="358666" y="1119306"/>
+            <a:ext cx="2520000" cy="2309694"/>
+          </a:xfrm>
+          <a:prstGeom prst="rect">
+            <a:avLst/>
+          </a:prstGeom>
+        </p:spPr>
+      </p:pic>
+      <p:pic>
+        <p:nvPicPr>
+          <p:cNvPr id="15" name="Grafik 14" descr="Ein Bild, das Screenshot, medizinische Bildgebung, Schwarzweiß enthält.&#10;&#10;Automatisch generierte Beschreibung">
+            <a:extLst>
+              <a:ext uri="{FF2B5EF4-FFF2-40B4-BE49-F238E27FC236}">
+                <a16:creationId xmlns:a16="http://schemas.microsoft.com/office/drawing/2014/main" id="{1C9CF40D-6C4D-E162-DED5-54A3160197EB}"/>
+              </a:ext>
+            </a:extLst>
+          </p:cNvPr>
+          <p:cNvPicPr>
+            <a:picLocks noChangeAspect="1"/>
+          </p:cNvPicPr>
+          <p:nvPr/>
+        </p:nvPicPr>
+        <p:blipFill>
+          <a:blip r:embed="rId7">
+            <a:extLst>
+              <a:ext uri="{28A0092B-C50C-407E-A947-70E740481C1C}">
+                <a14:useLocalDpi xmlns:a14="http://schemas.microsoft.com/office/drawing/2010/main" val="0"/>
+              </a:ext>
+            </a:extLst>
+          </a:blip>
+          <a:stretch>
+            <a:fillRect/>
+          </a:stretch>
+        </p:blipFill>
+        <p:spPr>
+          <a:xfrm>
+            <a:off x="2994280" y="322544"/>
+            <a:ext cx="2520000" cy="2309694"/>
+          </a:xfrm>
+          <a:prstGeom prst="rect">
+            <a:avLst/>
+          </a:prstGeom>
+        </p:spPr>
+      </p:pic>
+      <p:pic>
+        <p:nvPicPr>
+          <p:cNvPr id="19" name="Grafik 18" descr="Ein Bild, das Text, Screenshot, Software enthält.&#10;&#10;Automatisch generierte Beschreibung">
+            <a:extLst>
+              <a:ext uri="{FF2B5EF4-FFF2-40B4-BE49-F238E27FC236}">
+                <a16:creationId xmlns:a16="http://schemas.microsoft.com/office/drawing/2014/main" id="{12847CCC-2951-E7EE-5AF0-581CE2B3AC16}"/>
+              </a:ext>
+            </a:extLst>
+          </p:cNvPr>
+          <p:cNvPicPr>
+            <a:picLocks noChangeAspect="1"/>
+          </p:cNvPicPr>
+          <p:nvPr/>
+        </p:nvPicPr>
+        <p:blipFill>
+          <a:blip r:embed="rId8">
+            <a:extLst>
+              <a:ext uri="{28A0092B-C50C-407E-A947-70E740481C1C}">
+                <a14:useLocalDpi xmlns:a14="http://schemas.microsoft.com/office/drawing/2010/main" val="0"/>
+              </a:ext>
+            </a:extLst>
+          </a:blip>
+          <a:srcRect b="5425"/>
           <a:stretch/>
         </p:blipFill>
         <p:spPr>
           <a:xfrm>
-            <a:off x="300893" y="3269644"/>
-            <a:ext cx="3240000" cy="2531672"/>
+            <a:off x="5654911" y="322544"/>
+            <a:ext cx="3892423" cy="3539882"/>
           </a:xfrm>
           <a:prstGeom prst="rect">
             <a:avLst/>

</xml_diff>